<commit_message>
Update Presentacion M3 Clase 1 - Introducción EDA.pptx
</commit_message>
<xml_diff>
--- a/Sesion6/Presentacion M3 Clase 1 - Introducción EDA.pptx
+++ b/Sesion6/Presentacion M3 Clase 1 - Introducción EDA.pptx
@@ -16788,7 +16788,7 @@
               <a:pPr>
                 <a:defRPr/>
               </a:pPr>
-              <a:t>10/05/2024</a:t>
+              <a:t>21/08/2024</a:t>
             </a:fld>
             <a:endParaRPr lang="es-CO"/>
           </a:p>
@@ -17026,7 +17026,7 @@
               <a:pPr>
                 <a:defRPr/>
               </a:pPr>
-              <a:t>10/05/2024</a:t>
+              <a:t>21/08/2024</a:t>
             </a:fld>
             <a:endParaRPr lang="es-CO"/>
           </a:p>
@@ -21131,7 +21131,41 @@
                 <a:ea typeface="+mn-ea"/>
                 <a:cs typeface="Arial" pitchFamily="34" charset="0"/>
               </a:rPr>
-              <a:t>Los procesos de gobierno de datos se centran en 12 frentes: </a:t>
+              <a:t>Los procesos de gobierno de datos se centran en </a:t>
+            </a:r>
+            <a:r>
+              <a:rPr kumimoji="0" lang="es-CO" i="0" u="none" strike="noStrike" kern="1200" cap="none" spc="0" normalizeH="0" baseline="0" noProof="0">
+                <a:ln>
+                  <a:noFill/>
+                </a:ln>
+                <a:solidFill>
+                  <a:schemeClr val="tx1"/>
+                </a:solidFill>
+                <a:effectLst/>
+                <a:uLnTx/>
+                <a:uFillTx/>
+                <a:latin typeface="Arial" pitchFamily="34" charset="0"/>
+                <a:ea typeface="+mn-ea"/>
+                <a:cs typeface="Arial" pitchFamily="34" charset="0"/>
+              </a:rPr>
+              <a:t>los siguientes </a:t>
+            </a:r>
+            <a:r>
+              <a:rPr kumimoji="0" lang="es-CO" i="0" u="none" strike="noStrike" kern="1200" cap="none" spc="0" normalizeH="0" baseline="0" noProof="0" dirty="0">
+                <a:ln>
+                  <a:noFill/>
+                </a:ln>
+                <a:solidFill>
+                  <a:schemeClr val="tx1"/>
+                </a:solidFill>
+                <a:effectLst/>
+                <a:uLnTx/>
+                <a:uFillTx/>
+                <a:latin typeface="Arial" pitchFamily="34" charset="0"/>
+                <a:ea typeface="+mn-ea"/>
+                <a:cs typeface="Arial" pitchFamily="34" charset="0"/>
+              </a:rPr>
+              <a:t>frentes: </a:t>
             </a:r>
           </a:p>
         </p:txBody>

</xml_diff>